<commit_message>
final final presentation :D
Co-Authored-By: Diana Costa <dianasofia.costa@sapo.pt>
Co-Authored-By: Vitor Castro <vitorindeep@users.noreply.github.com>
</commit_message>
<xml_diff>
--- a/relatorio/LI4.pptx
+++ b/relatorio/LI4.pptx
@@ -7873,28 +7873,28 @@
             </a:pPr>
             <a:r>
               <a:rPr lang="pt-PT" sz="1600" dirty="0"/>
-              <a:t>Nesta fase: -elaborar um modelo geral da ideia a desenvolver </a:t>
+              <a:t>Nesta fase: - elaborar um modelo geral da ideia a desenvolver </a:t>
             </a:r>
           </a:p>
           <a:p>
             <a:pPr lvl="0" algn="just"/>
             <a:r>
               <a:rPr lang="pt-PT" sz="1600" dirty="0"/>
-              <a:t>			  -esclarecer alguns pontos</a:t>
+              <a:t>			  - esclarecer alguns pontos</a:t>
             </a:r>
           </a:p>
           <a:p>
             <a:pPr lvl="0" algn="just"/>
             <a:r>
               <a:rPr lang="pt-PT" sz="1600" dirty="0"/>
-              <a:t>			  -medidas de sucesso e viabilidade</a:t>
+              <a:t>			  - medidas de sucesso e viabilidade</a:t>
             </a:r>
           </a:p>
           <a:p>
             <a:pPr lvl="0" algn="just"/>
             <a:r>
               <a:rPr lang="pt-PT" sz="1600" dirty="0"/>
-              <a:t>			  -analisar os recursos necessários associados ao serviço. </a:t>
+              <a:t>			  - analisar os recursos necessários associados ao serviço. </a:t>
             </a:r>
           </a:p>
           <a:p>
@@ -7957,21 +7957,29 @@
             </a:pPr>
             <a:r>
               <a:rPr lang="pt-PT" sz="1600" dirty="0"/>
-              <a:t>Trabalho futuro: -definir os requisitos do sistema </a:t>
+              <a:t>Trabalho futuro: - definir os requisitos do sistema </a:t>
             </a:r>
           </a:p>
           <a:p>
             <a:pPr lvl="1" algn="just"/>
             <a:r>
               <a:rPr lang="pt-PT" sz="1600" dirty="0"/>
-              <a:t>			   -avançar com a arquitetura UML </a:t>
+              <a:t>			   - avançar com a arquitetura UML </a:t>
             </a:r>
           </a:p>
           <a:p>
             <a:pPr lvl="1" algn="just"/>
             <a:r>
               <a:rPr lang="pt-PT" sz="1600" dirty="0"/>
-              <a:t>		          -desenvolvimento da base de dados</a:t>
+              <a:t>		</a:t>
+            </a:r>
+            <a:r>
+              <a:rPr lang="pt-PT" sz="1600"/>
+              <a:t>          - desenvolvimento </a:t>
+            </a:r>
+            <a:r>
+              <a:rPr lang="pt-PT" sz="1600" dirty="0"/>
+              <a:t>da base de dados</a:t>
             </a:r>
           </a:p>
           <a:p>
@@ -8629,7 +8637,7 @@
               </a:lnSpc>
             </a:pPr>
             <a:r>
-              <a:rPr lang="pt-PT" sz="2000" b="1" dirty="0">
+              <a:rPr lang="pt-PT" sz="2000" dirty="0">
                 <a:solidFill>
                   <a:schemeClr val="tx1"/>
                 </a:solidFill>
@@ -9698,7 +9706,7 @@
             </a:r>
             <a:r>
               <a:rPr lang="pt-PT" dirty="0" err="1"/>
-              <a:t>Burguer</a:t>
+              <a:t>Burger</a:t>
             </a:r>
             <a:r>
               <a:rPr lang="pt-PT" dirty="0"/>

</xml_diff>

<commit_message>
This is the FINAL
not yours @diisnc . sorry not sorry :balloon:
</commit_message>
<xml_diff>
--- a/relatorio/LI4.pptx
+++ b/relatorio/LI4.pptx
@@ -211,7 +211,7 @@
           <a:p>
             <a:fld id="{FC77EE40-E473-4F3B-ABB7-4026700F0D66}" type="datetimeFigureOut">
               <a:rPr lang="pt-PT" smtClean="0"/>
-              <a:t>13/03/2018</a:t>
+              <a:t>13-03-2018</a:t>
             </a:fld>
             <a:endParaRPr lang="pt-PT"/>
           </a:p>
@@ -369,7 +369,7 @@
           <a:p>
             <a:fld id="{F2D13AFA-C489-4F08-BBC3-E69A09335FB4}" type="slidenum">
               <a:rPr lang="pt-PT" smtClean="0"/>
-              <a:t>‹nº›</a:t>
+              <a:t>‹#›</a:t>
             </a:fld>
             <a:endParaRPr lang="pt-PT"/>
           </a:p>
@@ -1328,7 +1328,7 @@
             <a:fld id="{D57F1E4F-1CFF-5643-939E-217C01CDF565}" type="slidenum">
               <a:rPr lang="en-US" dirty="0"/>
               <a:pPr/>
-              <a:t>‹nº›</a:t>
+              <a:t>‹#›</a:t>
             </a:fld>
             <a:endParaRPr lang="en-US" dirty="0"/>
           </a:p>
@@ -1576,7 +1576,7 @@
             <a:fld id="{D57F1E4F-1CFF-5643-939E-217C01CDF565}" type="slidenum">
               <a:rPr lang="en-US" dirty="0"/>
               <a:pPr/>
-              <a:t>‹nº›</a:t>
+              <a:t>‹#›</a:t>
             </a:fld>
             <a:endParaRPr lang="en-US" dirty="0"/>
           </a:p>
@@ -1887,7 +1887,7 @@
             <a:fld id="{D57F1E4F-1CFF-5643-939E-217C01CDF565}" type="slidenum">
               <a:rPr lang="en-US" dirty="0"/>
               <a:pPr/>
-              <a:t>‹nº›</a:t>
+              <a:t>‹#›</a:t>
             </a:fld>
             <a:endParaRPr lang="en-US" dirty="0"/>
           </a:p>
@@ -2225,7 +2225,7 @@
             <a:fld id="{D57F1E4F-1CFF-5643-939E-217C01CDF565}" type="slidenum">
               <a:rPr lang="en-US" dirty="0"/>
               <a:pPr/>
-              <a:t>‹nº›</a:t>
+              <a:t>‹#›</a:t>
             </a:fld>
             <a:endParaRPr lang="en-US" dirty="0"/>
           </a:p>
@@ -2536,7 +2536,7 @@
             <a:fld id="{D57F1E4F-1CFF-5643-939E-217C01CDF565}" type="slidenum">
               <a:rPr lang="en-US" dirty="0"/>
               <a:pPr/>
-              <a:t>‹nº›</a:t>
+              <a:t>‹#›</a:t>
             </a:fld>
             <a:endParaRPr lang="en-US" dirty="0"/>
           </a:p>
@@ -2926,7 +2926,7 @@
             <a:fld id="{D57F1E4F-1CFF-5643-939E-217C01CDF565}" type="slidenum">
               <a:rPr lang="en-US" dirty="0"/>
               <a:pPr/>
-              <a:t>‹nº›</a:t>
+              <a:t>‹#›</a:t>
             </a:fld>
             <a:endParaRPr lang="en-US" dirty="0"/>
           </a:p>
@@ -3091,7 +3091,7 @@
           <a:p>
             <a:fld id="{89333C77-0158-454C-844F-B7AB9BD7DAD4}" type="slidenum">
               <a:rPr lang="en-US" dirty="0"/>
-              <a:t>‹nº›</a:t>
+              <a:t>‹#›</a:t>
             </a:fld>
             <a:endParaRPr lang="en-US" dirty="0"/>
           </a:p>
@@ -3268,7 +3268,7 @@
             <a:fld id="{D57F1E4F-1CFF-5643-939E-217C01CDF565}" type="slidenum">
               <a:rPr lang="en-US" dirty="0"/>
               <a:pPr/>
-              <a:t>‹nº›</a:t>
+              <a:t>‹#›</a:t>
             </a:fld>
             <a:endParaRPr lang="en-US" dirty="0"/>
           </a:p>
@@ -3441,7 +3441,7 @@
             <a:fld id="{D57F1E4F-1CFF-5643-939E-217C01CDF565}" type="slidenum">
               <a:rPr lang="en-US" dirty="0"/>
               <a:pPr/>
-              <a:t>‹nº›</a:t>
+              <a:t>‹#›</a:t>
             </a:fld>
             <a:endParaRPr lang="en-US" dirty="0"/>
           </a:p>
@@ -3685,7 +3685,7 @@
             <a:fld id="{D57F1E4F-1CFF-5643-939E-217C01CDF565}" type="slidenum">
               <a:rPr lang="en-US" dirty="0"/>
               <a:pPr/>
-              <a:t>‹nº›</a:t>
+              <a:t>‹#›</a:t>
             </a:fld>
             <a:endParaRPr lang="en-US" dirty="0"/>
           </a:p>
@@ -3912,7 +3912,7 @@
           <a:p>
             <a:fld id="{6FF9F0C5-380F-41C2-899A-BAC0F0927E16}" type="slidenum">
               <a:rPr lang="en-US" dirty="0"/>
-              <a:t>‹nº›</a:t>
+              <a:t>‹#›</a:t>
             </a:fld>
             <a:endParaRPr lang="en-US" dirty="0"/>
           </a:p>
@@ -4283,7 +4283,7 @@
             <a:fld id="{D57F1E4F-1CFF-5643-939E-217C01CDF565}" type="slidenum">
               <a:rPr lang="en-US" dirty="0"/>
               <a:pPr/>
-              <a:t>‹nº›</a:t>
+              <a:t>‹#›</a:t>
             </a:fld>
             <a:endParaRPr lang="en-US" dirty="0"/>
           </a:p>
@@ -4403,7 +4403,7 @@
             <a:fld id="{D57F1E4F-1CFF-5643-939E-217C01CDF565}" type="slidenum">
               <a:rPr lang="en-US" dirty="0"/>
               <a:pPr/>
-              <a:t>‹nº›</a:t>
+              <a:t>‹#›</a:t>
             </a:fld>
             <a:endParaRPr lang="en-US" dirty="0"/>
           </a:p>
@@ -4495,7 +4495,7 @@
             <a:fld id="{D57F1E4F-1CFF-5643-939E-217C01CDF565}" type="slidenum">
               <a:rPr lang="en-US" dirty="0"/>
               <a:pPr/>
-              <a:t>‹nº›</a:t>
+              <a:t>‹#›</a:t>
             </a:fld>
             <a:endParaRPr lang="en-US" dirty="0"/>
           </a:p>
@@ -4745,7 +4745,7 @@
           <a:p>
             <a:fld id="{519954A3-9DFD-4C44-94BA-B95130A3BA1C}" type="slidenum">
               <a:rPr lang="en-US" dirty="0"/>
-              <a:t>‹nº›</a:t>
+              <a:t>‹#›</a:t>
             </a:fld>
             <a:endParaRPr lang="en-US" dirty="0"/>
           </a:p>
@@ -5005,7 +5005,7 @@
             <a:fld id="{D57F1E4F-1CFF-5643-939E-217C01CDF565}" type="slidenum">
               <a:rPr lang="en-US" dirty="0"/>
               <a:pPr/>
-              <a:t>‹nº›</a:t>
+              <a:t>‹#›</a:t>
             </a:fld>
             <a:endParaRPr lang="en-US" dirty="0"/>
           </a:p>
@@ -5779,7 +5779,7 @@
             <a:fld id="{D57F1E4F-1CFF-5643-939E-217C01CDF565}" type="slidenum">
               <a:rPr lang="en-US" dirty="0"/>
               <a:pPr/>
-              <a:t>‹nº›</a:t>
+              <a:t>‹#›</a:t>
             </a:fld>
             <a:endParaRPr lang="en-US" dirty="0"/>
           </a:p>
@@ -6719,6 +6719,13 @@
       </p:transition>
     </mc:Fallback>
   </mc:AlternateContent>
+  <p:timing>
+    <p:tnLst>
+      <p:par>
+        <p:cTn id="1" dur="indefinite" restart="never" nodeType="tmRoot"/>
+      </p:par>
+    </p:tnLst>
+  </p:timing>
 </p:sld>
 </file>
 
@@ -6878,7 +6885,31 @@
             </a:pPr>
             <a:r>
               <a:rPr lang="pt-PT" sz="1600" dirty="0"/>
-              <a:t>Todas as etapas do processo de desenvolvimento devem cumprir os prazos estabelecidos;</a:t>
+              <a:t>Todas as etapas do processo de desenvolvimento devem cumprir os </a:t>
+            </a:r>
+            <a:r>
+              <a:rPr lang="pt-PT" sz="1600" b="1" dirty="0">
+                <a:solidFill>
+                  <a:schemeClr val="accent2"/>
+                </a:solidFill>
+              </a:rPr>
+              <a:t>prazos</a:t>
+            </a:r>
+            <a:r>
+              <a:rPr lang="pt-PT" sz="1600" dirty="0"/>
+              <a:t> </a:t>
+            </a:r>
+            <a:r>
+              <a:rPr lang="pt-PT" sz="1600" b="1" dirty="0">
+                <a:solidFill>
+                  <a:schemeClr val="accent2"/>
+                </a:solidFill>
+              </a:rPr>
+              <a:t>estabelecidos</a:t>
+            </a:r>
+            <a:r>
+              <a:rPr lang="pt-PT" sz="1600" dirty="0"/>
+              <a:t>;</a:t>
             </a:r>
           </a:p>
           <a:p>
@@ -6895,7 +6926,19 @@
             </a:pPr>
             <a:r>
               <a:rPr lang="pt-PT" sz="1600" dirty="0"/>
-              <a:t>Todos os requisitos identificados devem estar presentes na aplicação final;</a:t>
+              <a:t>Todos os </a:t>
+            </a:r>
+            <a:r>
+              <a:rPr lang="pt-PT" sz="1600" b="1" dirty="0">
+                <a:solidFill>
+                  <a:schemeClr val="accent2"/>
+                </a:solidFill>
+              </a:rPr>
+              <a:t>requisitos</a:t>
+            </a:r>
+            <a:r>
+              <a:rPr lang="pt-PT" sz="1600" dirty="0"/>
+              <a:t> identificados devem estar presentes na aplicação final;</a:t>
             </a:r>
           </a:p>
           <a:p>
@@ -6912,7 +6955,19 @@
             </a:pPr>
             <a:r>
               <a:rPr lang="pt-PT" sz="1600" dirty="0"/>
-              <a:t>Verificar escalabilidade do sistema para outros infantários;</a:t>
+              <a:t>Verificar </a:t>
+            </a:r>
+            <a:r>
+              <a:rPr lang="pt-PT" sz="1600" b="1" dirty="0">
+                <a:solidFill>
+                  <a:schemeClr val="accent2"/>
+                </a:solidFill>
+              </a:rPr>
+              <a:t>escalabilidade</a:t>
+            </a:r>
+            <a:r>
+              <a:rPr lang="pt-PT" sz="1600" dirty="0"/>
+              <a:t> do sistema para outros infantários;</a:t>
             </a:r>
           </a:p>
           <a:p>
@@ -6928,8 +6983,28 @@
               <a:buChar char="•"/>
             </a:pPr>
             <a:r>
+              <a:rPr lang="pt-PT" sz="1600" b="1" dirty="0">
+                <a:solidFill>
+                  <a:schemeClr val="accent2"/>
+                </a:solidFill>
+              </a:rPr>
+              <a:t>Utilização fácil e frequente </a:t>
+            </a:r>
+            <a:r>
               <a:rPr lang="pt-PT" sz="1600" dirty="0"/>
-              <a:t>Utilização fácil e frequente da aplicação pelos utilizadores alvo, com um crescimento consecutivo no número de usos da plataforma durante o primeiro ano;</a:t>
+              <a:t>da aplicação pelos utilizadores alvo, com um </a:t>
+            </a:r>
+            <a:r>
+              <a:rPr lang="pt-PT" sz="1600" b="1" dirty="0">
+                <a:solidFill>
+                  <a:schemeClr val="accent2"/>
+                </a:solidFill>
+              </a:rPr>
+              <a:t>crescimento consecutivo</a:t>
+            </a:r>
+            <a:r>
+              <a:rPr lang="pt-PT" sz="1600" dirty="0"/>
+              <a:t> no número de usos da plataforma durante o primeiro ano;</a:t>
             </a:r>
           </a:p>
           <a:p>
@@ -6946,7 +7021,19 @@
             </a:pPr>
             <a:r>
               <a:rPr lang="pt-PT" sz="1600" dirty="0"/>
-              <a:t>Permitir aos utilizadores o agendamento do serviço por um intervalo de tempo variável;</a:t>
+              <a:t>Permitir aos utilizadores o agendamento do serviço por um intervalo de </a:t>
+            </a:r>
+            <a:r>
+              <a:rPr lang="pt-PT" sz="1600" b="1" dirty="0">
+                <a:solidFill>
+                  <a:schemeClr val="accent2"/>
+                </a:solidFill>
+              </a:rPr>
+              <a:t>tempo variável</a:t>
+            </a:r>
+            <a:r>
+              <a:rPr lang="pt-PT" sz="1600" dirty="0"/>
+              <a:t>;</a:t>
             </a:r>
           </a:p>
           <a:p>
@@ -6963,7 +7050,19 @@
             </a:pPr>
             <a:r>
               <a:rPr lang="pt-PT" sz="1600" dirty="0"/>
-              <a:t>Este agendamento também é extensível, oferecendo a possibilidade da prestação da atividade em horários em que os serviços convencionais não estão ativos;</a:t>
+              <a:t>Este agendamento também é </a:t>
+            </a:r>
+            <a:r>
+              <a:rPr lang="pt-PT" sz="1600" b="1" dirty="0">
+                <a:solidFill>
+                  <a:schemeClr val="accent2"/>
+                </a:solidFill>
+              </a:rPr>
+              <a:t>extensível</a:t>
+            </a:r>
+            <a:r>
+              <a:rPr lang="pt-PT" sz="1600" dirty="0"/>
+              <a:t>, oferecendo a possibilidade da prestação da atividade em horários em que os serviços convencionais não estão ativos;</a:t>
             </a:r>
           </a:p>
           <a:p>
@@ -6980,7 +7079,19 @@
             </a:pPr>
             <a:r>
               <a:rPr lang="pt-PT" sz="1600" dirty="0"/>
-              <a:t>Liberar os usuários do transtorno da deslocação aos infantários, para trazer os filhos de volta a casa;</a:t>
+              <a:t>Liberar os usuários do </a:t>
+            </a:r>
+            <a:r>
+              <a:rPr lang="pt-PT" sz="1600" b="1" dirty="0">
+                <a:solidFill>
+                  <a:schemeClr val="accent2"/>
+                </a:solidFill>
+              </a:rPr>
+              <a:t>transtorno da deslocação </a:t>
+            </a:r>
+            <a:r>
+              <a:rPr lang="pt-PT" sz="1600" dirty="0"/>
+              <a:t>aos infantários, para trazer os filhos de volta a casa;</a:t>
             </a:r>
           </a:p>
           <a:p>
@@ -6997,7 +7108,19 @@
             </a:pPr>
             <a:r>
               <a:rPr lang="pt-PT" sz="1600" dirty="0"/>
-              <a:t>Oferecer um método de pagamento homogéneo;</a:t>
+              <a:t>Oferecer um método de </a:t>
+            </a:r>
+            <a:r>
+              <a:rPr lang="pt-PT" sz="1600" b="1" dirty="0">
+                <a:solidFill>
+                  <a:schemeClr val="accent2"/>
+                </a:solidFill>
+              </a:rPr>
+              <a:t>pagamento homogéneo</a:t>
+            </a:r>
+            <a:r>
+              <a:rPr lang="pt-PT" sz="1600" dirty="0"/>
+              <a:t>;</a:t>
             </a:r>
           </a:p>
           <a:p>
@@ -7014,7 +7137,19 @@
             </a:pPr>
             <a:r>
               <a:rPr lang="pt-PT" sz="1600" dirty="0"/>
-              <a:t>Garantir uma maior viabilidade do projeto através de um sistema de avaliação.</a:t>
+              <a:t>Garantir uma maior viabilidade do projeto através de um </a:t>
+            </a:r>
+            <a:r>
+              <a:rPr lang="pt-PT" sz="1600" b="1" dirty="0">
+                <a:solidFill>
+                  <a:schemeClr val="accent2"/>
+                </a:solidFill>
+              </a:rPr>
+              <a:t>sistema de avaliação</a:t>
+            </a:r>
+            <a:r>
+              <a:rPr lang="pt-PT" sz="1600" dirty="0"/>
+              <a:t>.</a:t>
             </a:r>
           </a:p>
           <a:p>
@@ -7030,8 +7165,16 @@
               <a:buChar char="•"/>
             </a:pPr>
             <a:r>
+              <a:rPr lang="pt-PT" sz="1600" b="1" dirty="0">
+                <a:solidFill>
+                  <a:schemeClr val="accent2"/>
+                </a:solidFill>
+              </a:rPr>
+              <a:t>Funcionar 24h, 365 dias por ano</a:t>
+            </a:r>
+            <a:r>
               <a:rPr lang="pt-PT" sz="1600" dirty="0"/>
-              <a:t>Funcionar 24h, 365 dias por ano!</a:t>
+              <a:t>!</a:t>
             </a:r>
           </a:p>
         </p:txBody>
@@ -7058,6 +7201,13 @@
       </p:transition>
     </mc:Fallback>
   </mc:AlternateContent>
+  <p:timing>
+    <p:tnLst>
+      <p:par>
+        <p:cTn id="1" dur="indefinite" restart="never" nodeType="tmRoot"/>
+      </p:par>
+    </p:tnLst>
+  </p:timing>
 </p:sld>
 </file>
 
@@ -7223,8 +7373,8 @@
         </p:blipFill>
         <p:spPr bwMode="auto">
           <a:xfrm>
-            <a:off x="1412221" y="1555707"/>
-            <a:ext cx="6627669" cy="3383845"/>
+            <a:off x="563038" y="1723658"/>
+            <a:ext cx="8868345" cy="4527852"/>
           </a:xfrm>
           <a:prstGeom prst="rect">
             <a:avLst/>
@@ -7276,6 +7426,13 @@
       </p:transition>
     </mc:Fallback>
   </mc:AlternateContent>
+  <p:timing>
+    <p:tnLst>
+      <p:par>
+        <p:cTn id="1" dur="indefinite" restart="never" nodeType="tmRoot"/>
+      </p:par>
+    </p:tnLst>
+  </p:timing>
 </p:sld>
 </file>
 
@@ -7441,8 +7598,8 @@
         </p:blipFill>
         <p:spPr bwMode="auto">
           <a:xfrm>
-            <a:off x="957263" y="1871662"/>
-            <a:ext cx="8152172" cy="1719263"/>
+            <a:off x="283967" y="2244886"/>
+            <a:ext cx="9643804" cy="2033843"/>
           </a:xfrm>
           <a:prstGeom prst="rect">
             <a:avLst/>
@@ -7482,6 +7639,13 @@
   <p:clrMapOvr>
     <a:masterClrMapping/>
   </p:clrMapOvr>
+  <p:timing>
+    <p:tnLst>
+      <p:par>
+        <p:cTn id="1" dur="indefinite" restart="never" nodeType="tmRoot"/>
+      </p:par>
+    </p:tnLst>
+  </p:timing>
 </p:sld>
 </file>
 
@@ -7647,8 +7811,8 @@
         </p:blipFill>
         <p:spPr bwMode="auto">
           <a:xfrm>
-            <a:off x="804863" y="2005013"/>
-            <a:ext cx="8613202" cy="1947862"/>
+            <a:off x="283966" y="2340914"/>
+            <a:ext cx="9452991" cy="2137779"/>
           </a:xfrm>
           <a:prstGeom prst="rect">
             <a:avLst/>
@@ -7688,6 +7852,13 @@
   <p:clrMapOvr>
     <a:masterClrMapping/>
   </p:clrMapOvr>
+  <p:timing>
+    <p:tnLst>
+      <p:par>
+        <p:cTn id="1" dur="indefinite" restart="never" nodeType="tmRoot"/>
+      </p:par>
+    </p:tnLst>
+  </p:timing>
 </p:sld>
 </file>
 
@@ -7873,7 +8044,31 @@
             </a:pPr>
             <a:r>
               <a:rPr lang="pt-PT" sz="1600" dirty="0"/>
-              <a:t>Nesta fase: -elaborar um modelo geral da ideia a desenvolver </a:t>
+              <a:t>Nesta fase: </a:t>
+            </a:r>
+            <a:r>
+              <a:rPr lang="pt-PT" sz="1600" b="1" dirty="0">
+                <a:solidFill>
+                  <a:schemeClr val="accent1"/>
+                </a:solidFill>
+              </a:rPr>
+              <a:t> </a:t>
+            </a:r>
+            <a:r>
+              <a:rPr lang="pt-PT" sz="1600" b="1" dirty="0" smtClean="0">
+                <a:solidFill>
+                  <a:schemeClr val="accent1"/>
+                </a:solidFill>
+              </a:rPr>
+              <a:t> </a:t>
+            </a:r>
+            <a:r>
+              <a:rPr lang="pt-PT" sz="1600" dirty="0" smtClean="0"/>
+              <a:t>-</a:t>
+            </a:r>
+            <a:r>
+              <a:rPr lang="pt-PT" sz="1600" dirty="0"/>
+              <a:t>elaborar um modelo geral da ideia a desenvolver </a:t>
             </a:r>
           </a:p>
           <a:p>
@@ -7957,7 +8152,15 @@
             </a:pPr>
             <a:r>
               <a:rPr lang="pt-PT" sz="1600" dirty="0"/>
-              <a:t>Trabalho futuro: -definir os requisitos do sistema </a:t>
+              <a:t>Trabalho futuro: </a:t>
+            </a:r>
+            <a:r>
+              <a:rPr lang="pt-PT" sz="1600" dirty="0" smtClean="0"/>
+              <a:t>   -</a:t>
+            </a:r>
+            <a:r>
+              <a:rPr lang="pt-PT" sz="1600" dirty="0"/>
+              <a:t>definir os requisitos do sistema </a:t>
             </a:r>
           </a:p>
           <a:p>
@@ -8002,7 +8205,19 @@
             </a:pPr>
             <a:r>
               <a:rPr lang="pt-PT" sz="1600" dirty="0"/>
-              <a:t>Acima de tudo, O grupo espera conseguir finalizar as próximas etapas e tirar proveito das mesmas, levando consigo conhecimentos úteis para a vida profissional futura. </a:t>
+              <a:t>Acima de tudo, O grupo espera conseguir finalizar as próximas etapas e tirar proveito das mesmas, levando consigo </a:t>
+            </a:r>
+            <a:r>
+              <a:rPr lang="pt-PT" sz="1600" b="1" dirty="0">
+                <a:solidFill>
+                  <a:schemeClr val="accent1"/>
+                </a:solidFill>
+              </a:rPr>
+              <a:t>conhecimentos úteis</a:t>
+            </a:r>
+            <a:r>
+              <a:rPr lang="pt-PT" sz="1600" dirty="0"/>
+              <a:t> para a vida profissional futura. </a:t>
             </a:r>
           </a:p>
           <a:p>
@@ -8043,6 +8258,13 @@
       </p:transition>
     </mc:Fallback>
   </mc:AlternateContent>
+  <p:timing>
+    <p:tnLst>
+      <p:par>
+        <p:cTn id="1" dur="indefinite" restart="never" nodeType="tmRoot"/>
+      </p:par>
+    </p:tnLst>
+  </p:timing>
 </p:sld>
 </file>
 
@@ -8560,6 +8782,13 @@
       </p:transition>
     </mc:Fallback>
   </mc:AlternateContent>
+  <p:timing>
+    <p:tnLst>
+      <p:par>
+        <p:cTn id="1" dur="indefinite" restart="never" nodeType="tmRoot"/>
+      </p:par>
+    </p:tnLst>
+  </p:timing>
 </p:sld>
 </file>
 
@@ -8629,13 +8858,26 @@
               </a:lnSpc>
             </a:pPr>
             <a:r>
-              <a:rPr lang="pt-PT" sz="2000" b="1" dirty="0">
+              <a:rPr lang="pt-PT" sz="2000" dirty="0">
                 <a:solidFill>
                   <a:schemeClr val="tx1"/>
                 </a:solidFill>
               </a:rPr>
-              <a:t>Motivação e Objetivos </a:t>
-            </a:r>
+              <a:t>Motivação e </a:t>
+            </a:r>
+            <a:r>
+              <a:rPr lang="pt-PT" sz="2000" dirty="0" smtClean="0">
+                <a:solidFill>
+                  <a:schemeClr val="tx1"/>
+                </a:solidFill>
+              </a:rPr>
+              <a:t>Objetivos</a:t>
+            </a:r>
+            <a:endParaRPr lang="pt-PT" sz="2000" dirty="0">
+              <a:solidFill>
+                <a:schemeClr val="tx1"/>
+              </a:solidFill>
+            </a:endParaRPr>
           </a:p>
           <a:p>
             <a:pPr>
@@ -8739,6 +8981,13 @@
   <p:clrMapOvr>
     <a:masterClrMapping/>
   </p:clrMapOvr>
+  <p:timing>
+    <p:tnLst>
+      <p:par>
+        <p:cTn id="1" dur="indefinite" restart="never" nodeType="tmRoot"/>
+      </p:par>
+    </p:tnLst>
+  </p:timing>
 </p:sld>
 </file>
 
@@ -8918,12 +9167,36 @@
               <a:t>Aumenta a carga horária dos trabalhadores -&gt; </a:t>
             </a:r>
             <a:r>
+              <a:rPr lang="pt-PT" sz="1600" b="1" dirty="0">
+                <a:solidFill>
+                  <a:schemeClr val="accent2"/>
+                </a:solidFill>
+              </a:rPr>
+              <a:t>problema</a:t>
+            </a:r>
+            <a:r>
               <a:rPr lang="pt-PT" sz="1600" dirty="0">
                 <a:solidFill>
                   <a:srgbClr val="FF0000"/>
                 </a:solidFill>
               </a:rPr>
-              <a:t>problema sério </a:t>
+              <a:t> </a:t>
+            </a:r>
+            <a:r>
+              <a:rPr lang="pt-PT" sz="1600" b="1" dirty="0">
+                <a:solidFill>
+                  <a:schemeClr val="accent2"/>
+                </a:solidFill>
+              </a:rPr>
+              <a:t>sério</a:t>
+            </a:r>
+            <a:r>
+              <a:rPr lang="pt-PT" sz="1600" dirty="0">
+                <a:solidFill>
+                  <a:srgbClr val="FF0000"/>
+                </a:solidFill>
+              </a:rPr>
+              <a:t> </a:t>
             </a:r>
             <a:r>
               <a:rPr lang="pt-PT" sz="1600" dirty="0"/>
@@ -8971,28 +9244,36 @@
               <a:t>			- </a:t>
             </a:r>
             <a:r>
-              <a:rPr lang="pt-PT" sz="1600" dirty="0">
-                <a:solidFill>
-                  <a:srgbClr val="FF0000"/>
+              <a:rPr lang="pt-PT" sz="1600" b="1" dirty="0">
+                <a:solidFill>
+                  <a:schemeClr val="accent2"/>
                 </a:solidFill>
               </a:rPr>
               <a:t>Surge, assim, a ideia de fazer um serviço ao domicilio de </a:t>
             </a:r>
             <a:r>
-              <a:rPr lang="pt-PT" sz="1600" dirty="0" err="1">
-                <a:solidFill>
-                  <a:srgbClr val="FF0000"/>
+              <a:rPr lang="pt-PT" sz="1600" b="1" dirty="0" err="1">
+                <a:solidFill>
+                  <a:schemeClr val="accent2"/>
                 </a:solidFill>
               </a:rPr>
               <a:t>babysitting</a:t>
             </a:r>
             <a:r>
-              <a:rPr lang="pt-PT" sz="1600" dirty="0"/>
+              <a:rPr lang="pt-PT" sz="1600" b="1" dirty="0">
+                <a:solidFill>
+                  <a:schemeClr val="accent2"/>
+                </a:solidFill>
+              </a:rPr>
               <a:t>; </a:t>
             </a:r>
           </a:p>
           <a:p>
-            <a:endParaRPr lang="pt-PT" sz="1600" dirty="0"/>
+            <a:endParaRPr lang="pt-PT" sz="1600" b="1" dirty="0">
+              <a:solidFill>
+                <a:schemeClr val="accent2"/>
+              </a:solidFill>
+            </a:endParaRPr>
           </a:p>
           <a:p>
             <a:pPr marL="342900" indent="-342900">
@@ -9059,6 +9340,13 @@
       </p:transition>
     </mc:Fallback>
   </mc:AlternateContent>
+  <p:timing>
+    <p:tnLst>
+      <p:par>
+        <p:cTn id="1" dur="indefinite" restart="never" nodeType="tmRoot"/>
+      </p:par>
+    </p:tnLst>
+  </p:timing>
 </p:sld>
 </file>
 
@@ -9113,7 +9401,31 @@
             </a:pPr>
             <a:r>
               <a:rPr lang="pt-PT" dirty="0"/>
-              <a:t>Dificuldade de encontrar alguém que seja responsável para tomar conta dos nossos filhos a horas tardias, ou a falta de disponibilidade dos infantários de tomar conta de crianças adoentadas;</a:t>
+              <a:t>Dificuldade de encontrar alguém que seja </a:t>
+            </a:r>
+            <a:r>
+              <a:rPr lang="pt-PT" b="1" dirty="0">
+                <a:solidFill>
+                  <a:schemeClr val="accent2"/>
+                </a:solidFill>
+              </a:rPr>
+              <a:t>responsável</a:t>
+            </a:r>
+            <a:r>
+              <a:rPr lang="pt-PT" dirty="0"/>
+              <a:t> para tomar conta dos nossos filhos a </a:t>
+            </a:r>
+            <a:r>
+              <a:rPr lang="pt-PT" b="1" dirty="0">
+                <a:solidFill>
+                  <a:schemeClr val="accent2"/>
+                </a:solidFill>
+              </a:rPr>
+              <a:t>horas tardias</a:t>
+            </a:r>
+            <a:r>
+              <a:rPr lang="pt-PT" dirty="0"/>
+              <a:t>, ou a falta de disponibilidade dos infantários de tomar conta de crianças adoentadas;</a:t>
             </a:r>
           </a:p>
           <a:p>
@@ -9130,7 +9442,19 @@
             </a:pPr>
             <a:r>
               <a:rPr lang="pt-PT" dirty="0"/>
-              <a:t>A inexistência de um sistema que permita a requisição de serviços de babysitting online, em Portugal;</a:t>
+              <a:t>A </a:t>
+            </a:r>
+            <a:r>
+              <a:rPr lang="pt-PT" b="1" dirty="0">
+                <a:solidFill>
+                  <a:schemeClr val="accent2"/>
+                </a:solidFill>
+              </a:rPr>
+              <a:t>inexistência</a:t>
+            </a:r>
+            <a:r>
+              <a:rPr lang="pt-PT" dirty="0"/>
+              <a:t> de um sistema que permita a requisição de serviços de babysitting online, em Portugal;</a:t>
             </a:r>
           </a:p>
           <a:p>
@@ -9147,7 +9471,55 @@
             </a:pPr>
             <a:r>
               <a:rPr lang="pt-PT" dirty="0"/>
-              <a:t>A maioria dos trabalhadores dos infantários Bebés &amp; Companhia possuem idade no intervalo dos vinte aos trinta. Têm mais facilidade e disponibilidade para trabalharem em horas não tão comuns;</a:t>
+              <a:t>A maioria dos trabalhadores dos infantários Bebés &amp; Companhia possuem </a:t>
+            </a:r>
+            <a:r>
+              <a:rPr lang="pt-PT" b="1" dirty="0">
+                <a:solidFill>
+                  <a:schemeClr val="accent2"/>
+                </a:solidFill>
+              </a:rPr>
+              <a:t>idade</a:t>
+            </a:r>
+            <a:r>
+              <a:rPr lang="pt-PT" dirty="0"/>
+              <a:t> no intervalo dos </a:t>
+            </a:r>
+            <a:r>
+              <a:rPr lang="pt-PT" b="1" dirty="0">
+                <a:solidFill>
+                  <a:schemeClr val="accent2"/>
+                </a:solidFill>
+              </a:rPr>
+              <a:t>vinte aos trinta</a:t>
+            </a:r>
+            <a:r>
+              <a:rPr lang="pt-PT" dirty="0"/>
+              <a:t>. Têm mais facilidade e </a:t>
+            </a:r>
+            <a:r>
+              <a:rPr lang="pt-PT" b="1" dirty="0">
+                <a:solidFill>
+                  <a:schemeClr val="accent2"/>
+                </a:solidFill>
+              </a:rPr>
+              <a:t>disponibilidade</a:t>
+            </a:r>
+            <a:r>
+              <a:rPr lang="pt-PT" dirty="0"/>
+              <a:t> para trabalharem em </a:t>
+            </a:r>
+            <a:r>
+              <a:rPr lang="pt-PT" b="1" dirty="0">
+                <a:solidFill>
+                  <a:schemeClr val="accent2"/>
+                </a:solidFill>
+              </a:rPr>
+              <a:t>horas não tão comuns</a:t>
+            </a:r>
+            <a:r>
+              <a:rPr lang="pt-PT" dirty="0"/>
+              <a:t>;</a:t>
             </a:r>
           </a:p>
           <a:p>
@@ -9286,6 +9658,13 @@
       </p:transition>
     </mc:Fallback>
   </mc:AlternateContent>
+  <p:timing>
+    <p:tnLst>
+      <p:par>
+        <p:cTn id="1" dur="indefinite" restart="never" nodeType="tmRoot"/>
+      </p:par>
+    </p:tnLst>
+  </p:timing>
 </p:sld>
 </file>
 
@@ -9445,7 +9824,48 @@
             </a:pPr>
             <a:r>
               <a:rPr lang="pt-PT" sz="2000" dirty="0"/>
-              <a:t>Disponibilizar uma interface intuitiva que facilite a requisição de serviços de babysitting;</a:t>
+              <a:t>Disponibilizar uma interface </a:t>
+            </a:r>
+            <a:r>
+              <a:rPr lang="pt-PT" sz="2000" b="1" dirty="0">
+                <a:solidFill>
+                  <a:schemeClr val="accent2"/>
+                </a:solidFill>
+              </a:rPr>
+              <a:t>intuitiva</a:t>
+            </a:r>
+            <a:r>
+              <a:rPr lang="pt-PT" sz="2000" dirty="0"/>
+              <a:t> que facilite a requisição de serviços de babysitting;</a:t>
+            </a:r>
+          </a:p>
+          <a:p>
+            <a:pPr marL="342900" indent="-342900" algn="just">
+              <a:buFont typeface="Arial" panose="020B0604020202020204" pitchFamily="34" charset="0"/>
+              <a:buChar char="•"/>
+            </a:pPr>
+            <a:endParaRPr lang="pt-PT" sz="2000" b="1" dirty="0">
+              <a:solidFill>
+                <a:schemeClr val="accent2"/>
+              </a:solidFill>
+            </a:endParaRPr>
+          </a:p>
+          <a:p>
+            <a:pPr marL="342900" indent="-342900" algn="just">
+              <a:buFont typeface="Arial" panose="020B0604020202020204" pitchFamily="34" charset="0"/>
+              <a:buChar char="•"/>
+            </a:pPr>
+            <a:r>
+              <a:rPr lang="pt-PT" sz="2000" b="1" dirty="0">
+                <a:solidFill>
+                  <a:schemeClr val="accent2"/>
+                </a:solidFill>
+              </a:rPr>
+              <a:t>Localização</a:t>
+            </a:r>
+            <a:r>
+              <a:rPr lang="pt-PT" sz="2000" dirty="0"/>
+              <a:t> geográfica;</a:t>
             </a:r>
           </a:p>
           <a:p>
@@ -9462,7 +9882,27 @@
             </a:pPr>
             <a:r>
               <a:rPr lang="pt-PT" sz="2000" dirty="0"/>
-              <a:t>Localização geográfica;</a:t>
+              <a:t>Possibilidade do cliente </a:t>
+            </a:r>
+            <a:r>
+              <a:rPr lang="pt-PT" sz="2000" b="1" dirty="0">
+                <a:solidFill>
+                  <a:schemeClr val="accent2"/>
+                </a:solidFill>
+              </a:rPr>
+              <a:t>avaliar</a:t>
+            </a:r>
+            <a:r>
+              <a:rPr lang="pt-PT" sz="2000" dirty="0"/>
+              <a:t> determinado </a:t>
+            </a:r>
+            <a:r>
+              <a:rPr lang="pt-PT" sz="2000" dirty="0" err="1"/>
+              <a:t>babysitter</a:t>
+            </a:r>
+            <a:r>
+              <a:rPr lang="pt-PT" sz="2000" dirty="0"/>
+              <a:t>;</a:t>
             </a:r>
           </a:p>
           <a:p>
@@ -9478,33 +9918,16 @@
               <a:buChar char="•"/>
             </a:pPr>
             <a:r>
+              <a:rPr lang="pt-PT" sz="2000" b="1" dirty="0">
+                <a:solidFill>
+                  <a:schemeClr val="accent2"/>
+                </a:solidFill>
+              </a:rPr>
+              <a:t>Simplificar</a:t>
+            </a:r>
+            <a:r>
               <a:rPr lang="pt-PT" sz="2000" dirty="0"/>
-              <a:t>Possibilidade do cliente avaliar determinado </a:t>
-            </a:r>
-            <a:r>
-              <a:rPr lang="pt-PT" sz="2000" dirty="0" err="1"/>
-              <a:t>babysitter</a:t>
-            </a:r>
-            <a:r>
-              <a:rPr lang="pt-PT" sz="2000" dirty="0"/>
-              <a:t>;</a:t>
-            </a:r>
-          </a:p>
-          <a:p>
-            <a:pPr marL="342900" indent="-342900" algn="just">
-              <a:buFont typeface="Arial" panose="020B0604020202020204" pitchFamily="34" charset="0"/>
-              <a:buChar char="•"/>
-            </a:pPr>
-            <a:endParaRPr lang="pt-PT" sz="2000" dirty="0"/>
-          </a:p>
-          <a:p>
-            <a:pPr marL="342900" indent="-342900" algn="just">
-              <a:buFont typeface="Arial" panose="020B0604020202020204" pitchFamily="34" charset="0"/>
-              <a:buChar char="•"/>
-            </a:pPr>
-            <a:r>
-              <a:rPr lang="pt-PT" sz="2000" dirty="0"/>
-              <a:t>Simplificar a deslocação dos funcionários da empresa;</a:t>
+              <a:t> a deslocação dos funcionários da empresa;</a:t>
             </a:r>
           </a:p>
           <a:p>
@@ -9535,6 +9958,13 @@
       </p:transition>
     </mc:Fallback>
   </mc:AlternateContent>
+  <p:timing>
+    <p:tnLst>
+      <p:par>
+        <p:cTn id="1" dur="indefinite" restart="never" nodeType="tmRoot"/>
+      </p:par>
+    </p:tnLst>
+  </p:timing>
 </p:sld>
 </file>
 
@@ -9694,15 +10124,27 @@
             </a:pPr>
             <a:r>
               <a:rPr lang="pt-PT" dirty="0"/>
-              <a:t>Um sistema ao domicílio 24/365 é um modelo de negócio cada vez mais comum (Amazon, KFC, </a:t>
-            </a:r>
-            <a:r>
-              <a:rPr lang="pt-PT" dirty="0" err="1"/>
-              <a:t>Burguer</a:t>
+              <a:t>Um sistema ao domicílio 24/365 é um modelo de negócio </a:t>
+            </a:r>
+            <a:r>
+              <a:rPr lang="pt-PT" b="1" dirty="0">
+                <a:solidFill>
+                  <a:schemeClr val="accent2"/>
+                </a:solidFill>
+              </a:rPr>
+              <a:t>cada vez mais comum </a:t>
             </a:r>
             <a:r>
               <a:rPr lang="pt-PT" dirty="0"/>
-              <a:t> King,…);</a:t>
+              <a:t>(Amazon, KFC, </a:t>
+            </a:r>
+            <a:r>
+              <a:rPr lang="pt-PT" dirty="0" smtClean="0"/>
+              <a:t>Burger </a:t>
+            </a:r>
+            <a:r>
+              <a:rPr lang="pt-PT" dirty="0"/>
+              <a:t>King,…);</a:t>
             </a:r>
           </a:p>
           <a:p>
@@ -9719,7 +10161,19 @@
             </a:pPr>
             <a:r>
               <a:rPr lang="pt-PT" dirty="0"/>
-              <a:t>Há cada vez mais abertura do cliente a novas formas de comércio;</a:t>
+              <a:t>Há cada vez mais abertura do cliente a </a:t>
+            </a:r>
+            <a:r>
+              <a:rPr lang="pt-PT" b="1" dirty="0">
+                <a:solidFill>
+                  <a:schemeClr val="accent2"/>
+                </a:solidFill>
+              </a:rPr>
+              <a:t>novas formas </a:t>
+            </a:r>
+            <a:r>
+              <a:rPr lang="pt-PT" dirty="0"/>
+              <a:t>de comércio;</a:t>
             </a:r>
           </a:p>
           <a:p>
@@ -9736,7 +10190,19 @@
             </a:pPr>
             <a:r>
               <a:rPr lang="pt-PT" dirty="0"/>
-              <a:t>Um serviço de babysitting ao domicílio posiciona-se como uma opção de entrada num mercado estável;</a:t>
+              <a:t>Um serviço de babysitting ao domicílio posiciona-se como uma opção de entrada num </a:t>
+            </a:r>
+            <a:r>
+              <a:rPr lang="pt-PT" b="1" dirty="0">
+                <a:solidFill>
+                  <a:schemeClr val="accent2"/>
+                </a:solidFill>
+              </a:rPr>
+              <a:t>mercado estável</a:t>
+            </a:r>
+            <a:r>
+              <a:rPr lang="pt-PT" dirty="0"/>
+              <a:t>;</a:t>
             </a:r>
           </a:p>
           <a:p>
@@ -9753,7 +10219,19 @@
             </a:pPr>
             <a:r>
               <a:rPr lang="pt-PT" dirty="0"/>
-              <a:t>O estudo de mercado revelou grande recetividade à possibilidade de agendar um(a) </a:t>
+              <a:t>O estudo de mercado revelou grande </a:t>
+            </a:r>
+            <a:r>
+              <a:rPr lang="pt-PT" b="1" dirty="0">
+                <a:solidFill>
+                  <a:schemeClr val="accent2"/>
+                </a:solidFill>
+              </a:rPr>
+              <a:t>recetividade</a:t>
+            </a:r>
+            <a:r>
+              <a:rPr lang="pt-PT" dirty="0"/>
+              <a:t> à possibilidade de agendar um(a) </a:t>
             </a:r>
             <a:r>
               <a:rPr lang="pt-PT" dirty="0" err="1"/>
@@ -9761,7 +10239,19 @@
             </a:r>
             <a:r>
               <a:rPr lang="pt-PT" dirty="0"/>
-              <a:t> a qualquer altura do dia;</a:t>
+              <a:t> a </a:t>
+            </a:r>
+            <a:r>
+              <a:rPr lang="pt-PT" b="1" dirty="0">
+                <a:solidFill>
+                  <a:schemeClr val="accent2"/>
+                </a:solidFill>
+              </a:rPr>
+              <a:t>qualquer altura </a:t>
+            </a:r>
+            <a:r>
+              <a:rPr lang="pt-PT" dirty="0"/>
+              <a:t>do dia;</a:t>
             </a:r>
           </a:p>
           <a:p>
@@ -9778,7 +10268,19 @@
             </a:pPr>
             <a:r>
               <a:rPr lang="pt-PT" dirty="0"/>
-              <a:t>O serviço está associado a um lugar físico onde se podem conhecer os profissionais, o que aumenta a confiança por parte dos pais;</a:t>
+              <a:t>O serviço está associado a um </a:t>
+            </a:r>
+            <a:r>
+              <a:rPr lang="pt-PT" dirty="0">
+                <a:solidFill>
+                  <a:schemeClr val="accent2"/>
+                </a:solidFill>
+              </a:rPr>
+              <a:t>lugar físico </a:t>
+            </a:r>
+            <a:r>
+              <a:rPr lang="pt-PT" dirty="0"/>
+              <a:t>onde se podem conhecer os profissionais, o que aumenta a confiança por parte dos pais;</a:t>
             </a:r>
           </a:p>
           <a:p>
@@ -9822,6 +10324,13 @@
       </p:transition>
     </mc:Fallback>
   </mc:AlternateContent>
+  <p:timing>
+    <p:tnLst>
+      <p:par>
+        <p:cTn id="1" dur="indefinite" restart="never" nodeType="tmRoot"/>
+      </p:par>
+    </p:tnLst>
+  </p:timing>
 </p:sld>
 </file>
 
@@ -10593,6 +11102,13 @@
       </p:transition>
     </mc:Fallback>
   </mc:AlternateContent>
+  <p:timing>
+    <p:tnLst>
+      <p:par>
+        <p:cTn id="1" dur="indefinite" restart="never" nodeType="tmRoot"/>
+      </p:par>
+    </p:tnLst>
+  </p:timing>
 </p:sld>
 </file>
 
@@ -10769,7 +11285,19 @@
             </a:pPr>
             <a:r>
               <a:rPr lang="pt-PT" sz="2000" dirty="0"/>
-              <a:t>Uso dos computadores disponibilizados pela software </a:t>
+              <a:t>Uso dos </a:t>
+            </a:r>
+            <a:r>
+              <a:rPr lang="pt-PT" sz="2000" b="1" dirty="0">
+                <a:solidFill>
+                  <a:schemeClr val="accent2"/>
+                </a:solidFill>
+              </a:rPr>
+              <a:t>computadores</a:t>
+            </a:r>
+            <a:r>
+              <a:rPr lang="pt-PT" sz="2000" dirty="0"/>
+              <a:t> disponibilizados pela software </a:t>
             </a:r>
             <a:r>
               <a:rPr lang="pt-PT" sz="2000" dirty="0" err="1"/>
@@ -10830,8 +11358,16 @@
               <a:buChar char="•"/>
             </a:pPr>
             <a:r>
+              <a:rPr lang="pt-PT" sz="2000" b="1" dirty="0">
+                <a:solidFill>
+                  <a:schemeClr val="accent2"/>
+                </a:solidFill>
+              </a:rPr>
+              <a:t>Estudo de mercado </a:t>
+            </a:r>
+            <a:r>
               <a:rPr lang="pt-PT" sz="2000" dirty="0"/>
-              <a:t>Estudo de mercado para confirmar viabilização do sistema;</a:t>
+              <a:t>para confirmar viabilização do sistema;</a:t>
             </a:r>
           </a:p>
           <a:p>
@@ -10848,7 +11384,19 @@
             </a:pPr>
             <a:r>
               <a:rPr lang="pt-PT" sz="2000" dirty="0"/>
-              <a:t>Alocação de um servidor a funcionar 24/7;</a:t>
+              <a:t>Alocação de um </a:t>
+            </a:r>
+            <a:r>
+              <a:rPr lang="pt-PT" sz="2000" b="1" dirty="0">
+                <a:solidFill>
+                  <a:schemeClr val="accent2"/>
+                </a:solidFill>
+              </a:rPr>
+              <a:t>servidor</a:t>
+            </a:r>
+            <a:r>
+              <a:rPr lang="pt-PT" sz="2000" dirty="0"/>
+              <a:t> a funcionar 24/7;</a:t>
             </a:r>
           </a:p>
           <a:p>
@@ -10865,7 +11413,19 @@
             </a:pPr>
             <a:r>
               <a:rPr lang="pt-PT" sz="2000" dirty="0"/>
-              <a:t>Aquisição de tablets para desenvolvimento do sistema;</a:t>
+              <a:t>Aquisição de </a:t>
+            </a:r>
+            <a:r>
+              <a:rPr lang="pt-PT" sz="2000" b="1" dirty="0">
+                <a:solidFill>
+                  <a:schemeClr val="accent2"/>
+                </a:solidFill>
+              </a:rPr>
+              <a:t>tablets</a:t>
+            </a:r>
+            <a:r>
+              <a:rPr lang="pt-PT" sz="2000" dirty="0"/>
+              <a:t> para desenvolvimento do sistema;</a:t>
             </a:r>
           </a:p>
           <a:p>
@@ -10873,7 +11433,11 @@
               <a:buFont typeface="Arial" panose="020B0604020202020204" pitchFamily="34" charset="0"/>
               <a:buChar char="•"/>
             </a:pPr>
-            <a:endParaRPr lang="pt-PT" sz="2000" dirty="0"/>
+            <a:endParaRPr lang="pt-PT" sz="2000" b="1" dirty="0">
+              <a:solidFill>
+                <a:schemeClr val="accent2"/>
+              </a:solidFill>
+            </a:endParaRPr>
           </a:p>
         </p:txBody>
       </p:sp>
@@ -10899,6 +11463,13 @@
       </p:transition>
     </mc:Fallback>
   </mc:AlternateContent>
+  <p:timing>
+    <p:tnLst>
+      <p:par>
+        <p:cTn id="1" dur="indefinite" restart="never" nodeType="tmRoot"/>
+      </p:par>
+    </p:tnLst>
+  </p:timing>
 </p:sld>
 </file>
 
@@ -11053,8 +11624,8 @@
         </p:blipFill>
         <p:spPr bwMode="auto">
           <a:xfrm>
-            <a:off x="1981998" y="1136665"/>
-            <a:ext cx="6023485" cy="3006431"/>
+            <a:off x="1286756" y="1136665"/>
+            <a:ext cx="7578051" cy="3782343"/>
           </a:xfrm>
           <a:prstGeom prst="rect">
             <a:avLst/>
@@ -11098,7 +11669,7 @@
         </p:nvSpPr>
         <p:spPr>
           <a:xfrm>
-            <a:off x="500117" y="4323851"/>
+            <a:off x="444137" y="4919008"/>
             <a:ext cx="8987246" cy="1938992"/>
           </a:xfrm>
           <a:prstGeom prst="rect">
@@ -11135,7 +11706,31 @@
             </a:pPr>
             <a:r>
               <a:rPr lang="pt-PT" sz="2000" dirty="0"/>
-              <a:t>Expõe API pública disponibilizada através do site e API privada utilizada pela aplicação móvel.</a:t>
+              <a:t>Expõe API </a:t>
+            </a:r>
+            <a:r>
+              <a:rPr lang="pt-PT" sz="2000" b="1" dirty="0">
+                <a:solidFill>
+                  <a:schemeClr val="accent2"/>
+                </a:solidFill>
+              </a:rPr>
+              <a:t>pública</a:t>
+            </a:r>
+            <a:r>
+              <a:rPr lang="pt-PT" sz="2000" dirty="0"/>
+              <a:t> disponibilizada através do site e API </a:t>
+            </a:r>
+            <a:r>
+              <a:rPr lang="pt-PT" sz="2000" b="1" dirty="0">
+                <a:solidFill>
+                  <a:schemeClr val="accent2"/>
+                </a:solidFill>
+              </a:rPr>
+              <a:t>privada</a:t>
+            </a:r>
+            <a:r>
+              <a:rPr lang="pt-PT" sz="2000" dirty="0"/>
+              <a:t> utilizada pela aplicação móvel.</a:t>
             </a:r>
           </a:p>
           <a:p>
@@ -11176,6 +11771,13 @@
       </p:transition>
     </mc:Fallback>
   </mc:AlternateContent>
+  <p:timing>
+    <p:tnLst>
+      <p:par>
+        <p:cTn id="1" dur="indefinite" restart="never" nodeType="tmRoot"/>
+      </p:par>
+    </p:tnLst>
+  </p:timing>
 </p:sld>
 </file>
 

</xml_diff>